<commit_message>
Repo Cleanup and additions
</commit_message>
<xml_diff>
--- a/0419-tth-class-content/03-intro-js-hangman-dom/3.3/UT-JSJuggernaut.pptx
+++ b/0419-tth-class-content/03-intro-js-hangman-dom/3.3/UT-JSJuggernaut.pptx
@@ -1,6 +1,6 @@
 
 <file path=ppt/presentation.xml><?xml version="1.0" encoding="utf-8"?>
-<p:presentation xmlns:a="http://schemas.openxmlformats.org/drawingml/2006/main" xmlns:r="http://schemas.openxmlformats.org/officeDocument/2006/relationships" xmlns:p="http://schemas.openxmlformats.org/presentationml/2006/main" embedTrueTypeFonts="1">
+<p:presentation xmlns:a="http://schemas.openxmlformats.org/drawingml/2006/main" xmlns:r="http://schemas.openxmlformats.org/officeDocument/2006/relationships" xmlns:p="http://schemas.openxmlformats.org/presentationml/2006/main" saveSubsetFonts="1">
   <p:sldMasterIdLst>
     <p:sldMasterId id="2147483648" r:id="rId1"/>
     <p:sldMasterId id="2147483657" r:id="rId2"/>
@@ -48,27 +48,6 @@
   </p:sldIdLst>
   <p:sldSz cx="9144000" cy="6858000" type="screen4x3"/>
   <p:notesSz cx="7315200" cy="9601200"/>
-  <p:embeddedFontLst>
-    <p:embeddedFont>
-      <p:font typeface="Calibri Light" panose="020F0302020204030204" pitchFamily="34" charset="0"/>
-      <p:regular r:id="rId38"/>
-      <p:italic r:id="rId39"/>
-    </p:embeddedFont>
-    <p:embeddedFont>
-      <p:font typeface="Roboto" panose="02000000000000000000" pitchFamily="2" charset="0"/>
-      <p:regular r:id="rId40"/>
-      <p:bold r:id="rId41"/>
-      <p:italic r:id="rId42"/>
-      <p:boldItalic r:id="rId43"/>
-    </p:embeddedFont>
-    <p:embeddedFont>
-      <p:font typeface="Calibri" panose="020F0502020204030204" pitchFamily="34" charset="0"/>
-      <p:regular r:id="rId44"/>
-      <p:bold r:id="rId45"/>
-      <p:italic r:id="rId46"/>
-      <p:boldItalic r:id="rId47"/>
-    </p:embeddedFont>
-  </p:embeddedFontLst>
   <p:defaultTextStyle>
     <a:defPPr>
       <a:defRPr lang="en-US"/>
@@ -268,7 +247,7 @@
           <a:p>
             <a:fld id="{51A969EA-8566-418D-AC96-BC5F6E9FAB6C}" type="datetimeFigureOut">
               <a:rPr lang="en-US" smtClean="0"/>
-              <a:t>4/22/2016</a:t>
+              <a:t>5/7/16</a:t>
             </a:fld>
             <a:endParaRPr lang="en-US"/>
           </a:p>
@@ -433,7 +412,7 @@
           <a:p>
             <a:fld id="{33B07B4B-74D8-4C42-A719-1F93879497F8}" type="datetimeFigureOut">
               <a:rPr lang="en-US" smtClean="0"/>
-              <a:t>4/22/2016</a:t>
+              <a:t>5/7/16</a:t>
             </a:fld>
             <a:endParaRPr lang="en-US"/>
           </a:p>
@@ -7285,7 +7264,7 @@
           <a:p>
             <a:fld id="{06F2DAE4-C87D-464C-8529-C68309DD1CFC}" type="datetimeFigureOut">
               <a:rPr lang="en-US" smtClean="0"/>
-              <a:t>4/22/2016</a:t>
+              <a:t>5/7/16</a:t>
             </a:fld>
             <a:endParaRPr lang="en-US"/>
           </a:p>
@@ -7797,7 +7776,7 @@
           <a:p>
             <a:fld id="{B65C9255-9F07-4181-9AD2-897FFC0A3B7E}" type="datetimeFigureOut">
               <a:rPr lang="en-US" smtClean="0"/>
-              <a:t>4/22/2016</a:t>
+              <a:t>5/7/16</a:t>
             </a:fld>
             <a:endParaRPr lang="en-US"/>
           </a:p>
@@ -8327,7 +8306,7 @@
           <a:p>
             <a:fld id="{B65C9255-9F07-4181-9AD2-897FFC0A3B7E}" type="datetimeFigureOut">
               <a:rPr lang="en-US" smtClean="0"/>
-              <a:t>4/22/2016</a:t>
+              <a:t>5/7/16</a:t>
             </a:fld>
             <a:endParaRPr lang="en-US"/>
           </a:p>
@@ -8857,7 +8836,7 @@
           <a:p>
             <a:fld id="{B65C9255-9F07-4181-9AD2-897FFC0A3B7E}" type="datetimeFigureOut">
               <a:rPr lang="en-US" smtClean="0"/>
-              <a:t>4/22/2016</a:t>
+              <a:t>5/7/16</a:t>
             </a:fld>
             <a:endParaRPr lang="en-US"/>
           </a:p>
@@ -9297,8 +9276,12 @@
           <a:lstStyle/>
           <a:p>
             <a:r>
+              <a:rPr lang="en-US" dirty="0" smtClean="0"/>
+              <a:t>May 7, </a:t>
+            </a:r>
+            <a:r>
               <a:rPr lang="en-US" dirty="0"/>
-              <a:t>April 16, 2016</a:t>
+              <a:t>2016</a:t>
             </a:r>
           </a:p>
         </p:txBody>

</xml_diff>